<commit_message>
Created Component For Pizza Bot
Welcome Component
</commit_message>
<xml_diff>
--- a/022_91893+_+91897+Documentation.pptx
+++ b/022_91893+_+91897+Documentation.pptx
@@ -269,13 +269,106 @@
 <file path=ppt/revisionInfo.xml><?xml version="1.0" encoding="utf-8"?>
 <p1510:revInfo xmlns:a="http://schemas.openxmlformats.org/drawingml/2006/main" xmlns:r="http://schemas.openxmlformats.org/officeDocument/2006/relationships" xmlns:p1510="http://schemas.microsoft.com/office/powerpoint/2015/10/main">
   <p1510:revLst>
-    <p1510:client id="{4F71BE14-C53D-0861-4E1D-406D0C4E55B4}" v="10" dt="2022-02-05T23:55:44.511"/>
+    <p1510:client id="{AE64FCEC-2C26-418C-80E2-383765709D65}" v="4" dt="2022-02-09T23:05:33.616"/>
   </p1510:revLst>
 </p1510:revInfo>
 </file>
 
 <file path=ppt/changesInfos/changesInfo1.xml><?xml version="1.0" encoding="utf-8"?>
 <pc:chgInfo xmlns:a="http://schemas.openxmlformats.org/drawingml/2006/main" xmlns:r="http://schemas.openxmlformats.org/officeDocument/2006/relationships" xmlns:ac="http://schemas.microsoft.com/office/drawing/2013/main/command" xmlns:pc="http://schemas.microsoft.com/office/powerpoint/2013/main/command">
+  <pc:docChgLst>
+    <pc:chgData name="Sean Albertyn" userId="f499a6e059928ae0" providerId="LiveId" clId="{AE64FCEC-2C26-418C-80E2-383765709D65}"/>
+    <pc:docChg chg="undo custSel modSld">
+      <pc:chgData name="Sean Albertyn" userId="f499a6e059928ae0" providerId="LiveId" clId="{AE64FCEC-2C26-418C-80E2-383765709D65}" dt="2022-02-13T23:47:25.331" v="125" actId="1076"/>
+      <pc:docMkLst>
+        <pc:docMk/>
+      </pc:docMkLst>
+      <pc:sldChg chg="modSp mod">
+        <pc:chgData name="Sean Albertyn" userId="f499a6e059928ae0" providerId="LiveId" clId="{AE64FCEC-2C26-418C-80E2-383765709D65}" dt="2022-02-09T22:45:11.257" v="25" actId="20577"/>
+        <pc:sldMkLst>
+          <pc:docMk/>
+          <pc:sldMk cId="0" sldId="256"/>
+        </pc:sldMkLst>
+        <pc:spChg chg="mod">
+          <ac:chgData name="Sean Albertyn" userId="f499a6e059928ae0" providerId="LiveId" clId="{AE64FCEC-2C26-418C-80E2-383765709D65}" dt="2022-02-09T22:45:11.257" v="25" actId="20577"/>
+          <ac:spMkLst>
+            <pc:docMk/>
+            <pc:sldMk cId="0" sldId="256"/>
+            <ac:spMk id="55" creationId="{00000000-0000-0000-0000-000000000000}"/>
+          </ac:spMkLst>
+        </pc:spChg>
+      </pc:sldChg>
+      <pc:sldChg chg="addSp modSp mod">
+        <pc:chgData name="Sean Albertyn" userId="f499a6e059928ae0" providerId="LiveId" clId="{AE64FCEC-2C26-418C-80E2-383765709D65}" dt="2022-02-09T22:49:09.556" v="31" actId="14100"/>
+        <pc:sldMkLst>
+          <pc:docMk/>
+          <pc:sldMk cId="0" sldId="258"/>
+        </pc:sldMkLst>
+        <pc:picChg chg="add mod">
+          <ac:chgData name="Sean Albertyn" userId="f499a6e059928ae0" providerId="LiveId" clId="{AE64FCEC-2C26-418C-80E2-383765709D65}" dt="2022-02-09T22:49:09.556" v="31" actId="14100"/>
+          <ac:picMkLst>
+            <pc:docMk/>
+            <pc:sldMk cId="0" sldId="258"/>
+            <ac:picMk id="3" creationId="{0A711F85-FE64-43EF-B129-2C7D6375C8A1}"/>
+          </ac:picMkLst>
+        </pc:picChg>
+      </pc:sldChg>
+      <pc:sldChg chg="addSp modSp mod">
+        <pc:chgData name="Sean Albertyn" userId="f499a6e059928ae0" providerId="LiveId" clId="{AE64FCEC-2C26-418C-80E2-383765709D65}" dt="2022-02-09T23:05:37.207" v="34" actId="27614"/>
+        <pc:sldMkLst>
+          <pc:docMk/>
+          <pc:sldMk cId="0" sldId="259"/>
+        </pc:sldMkLst>
+        <pc:picChg chg="add mod">
+          <ac:chgData name="Sean Albertyn" userId="f499a6e059928ae0" providerId="LiveId" clId="{AE64FCEC-2C26-418C-80E2-383765709D65}" dt="2022-02-09T23:05:37.207" v="34" actId="27614"/>
+          <ac:picMkLst>
+            <pc:docMk/>
+            <pc:sldMk cId="0" sldId="259"/>
+            <ac:picMk id="3" creationId="{1A910F03-6A26-4AF1-8A56-03A86AF638FA}"/>
+          </ac:picMkLst>
+        </pc:picChg>
+      </pc:sldChg>
+      <pc:sldChg chg="addSp modSp mod">
+        <pc:chgData name="Sean Albertyn" userId="f499a6e059928ae0" providerId="LiveId" clId="{AE64FCEC-2C26-418C-80E2-383765709D65}" dt="2022-02-13T23:47:25.331" v="125" actId="1076"/>
+        <pc:sldMkLst>
+          <pc:docMk/>
+          <pc:sldMk cId="0" sldId="260"/>
+        </pc:sldMkLst>
+        <pc:spChg chg="mod">
+          <ac:chgData name="Sean Albertyn" userId="f499a6e059928ae0" providerId="LiveId" clId="{AE64FCEC-2C26-418C-80E2-383765709D65}" dt="2022-02-13T23:43:41.237" v="39" actId="20577"/>
+          <ac:spMkLst>
+            <pc:docMk/>
+            <pc:sldMk cId="0" sldId="260"/>
+            <ac:spMk id="78" creationId="{00000000-0000-0000-0000-000000000000}"/>
+          </ac:spMkLst>
+        </pc:spChg>
+        <pc:graphicFrameChg chg="mod modGraphic">
+          <ac:chgData name="Sean Albertyn" userId="f499a6e059928ae0" providerId="LiveId" clId="{AE64FCEC-2C26-418C-80E2-383765709D65}" dt="2022-02-13T23:47:25.331" v="125" actId="1076"/>
+          <ac:graphicFrameMkLst>
+            <pc:docMk/>
+            <pc:sldMk cId="0" sldId="260"/>
+            <ac:graphicFrameMk id="79" creationId="{00000000-0000-0000-0000-000000000000}"/>
+          </ac:graphicFrameMkLst>
+        </pc:graphicFrameChg>
+        <pc:picChg chg="add mod">
+          <ac:chgData name="Sean Albertyn" userId="f499a6e059928ae0" providerId="LiveId" clId="{AE64FCEC-2C26-418C-80E2-383765709D65}" dt="2022-02-13T23:45:32.056" v="45" actId="1076"/>
+          <ac:picMkLst>
+            <pc:docMk/>
+            <pc:sldMk cId="0" sldId="260"/>
+            <ac:picMk id="3" creationId="{E5C89010-92EE-4BD1-895D-3FDB2D757E2E}"/>
+          </ac:picMkLst>
+        </pc:picChg>
+        <pc:picChg chg="add mod">
+          <ac:chgData name="Sean Albertyn" userId="f499a6e059928ae0" providerId="LiveId" clId="{AE64FCEC-2C26-418C-80E2-383765709D65}" dt="2022-02-13T23:45:42.878" v="49" actId="1076"/>
+          <ac:picMkLst>
+            <pc:docMk/>
+            <pc:sldMk cId="0" sldId="260"/>
+            <ac:picMk id="5" creationId="{4D5852D8-4D00-41D8-AEF4-666CB79796DB}"/>
+          </ac:picMkLst>
+        </pc:picChg>
+      </pc:sldChg>
+    </pc:docChg>
+  </pc:docChgLst>
   <pc:docChgLst>
     <pc:chgData name="Mark Glasse" userId="S::m.glasse@sanctamaria.school.nz::4001b6f1-9796-4fe4-a857-9145db2b6168" providerId="AD" clId="Web-{4F71BE14-C53D-0861-4E1D-406D0C4E55B4}"/>
     <pc:docChg chg="modSld">
@@ -6405,25 +6498,18 @@
                   <a:srgbClr val="274E13"/>
                 </a:solidFill>
               </a:rPr>
-              <a:t>Link to </a:t>
-            </a:r>
-            <a:r>
-              <a:rPr lang="en" sz="2000" b="1" dirty="0" err="1">
-                <a:solidFill>
-                  <a:srgbClr val="274E13"/>
-                </a:solidFill>
-              </a:rPr>
-              <a:t>github</a:t>
+              <a:t>Link to github Repository: </a:t>
             </a:r>
             <a:r>
               <a:rPr lang="en" sz="2000" b="1" dirty="0">
                 <a:solidFill>
                   <a:srgbClr val="274E13"/>
                 </a:solidFill>
+                <a:hlinkClick r:id="rId3"/>
               </a:rPr>
-              <a:t> Repository: </a:t>
+              <a:t>GitHub</a:t>
             </a:r>
-            <a:endParaRPr sz="2000" b="1" dirty="0">
+            <a:endParaRPr sz="2000" dirty="0">
               <a:solidFill>
                 <a:srgbClr val="274E13"/>
               </a:solidFill>
@@ -6447,7 +6533,7 @@
               <a:buFont typeface="Arial"/>
               <a:buNone/>
             </a:pPr>
-            <a:endParaRPr sz="2000">
+            <a:endParaRPr lang="en" sz="2000" b="1" dirty="0">
               <a:solidFill>
                 <a:srgbClr val="274E13"/>
               </a:solidFill>
@@ -6477,23 +6563,16 @@
                   <a:srgbClr val="274E13"/>
                 </a:solidFill>
               </a:rPr>
-              <a:t>Links to </a:t>
-            </a:r>
-            <a:r>
-              <a:rPr lang="en" sz="2000" b="1" dirty="0" err="1">
-                <a:solidFill>
-                  <a:srgbClr val="274E13"/>
-                </a:solidFill>
-              </a:rPr>
-              <a:t>trello</a:t>
+              <a:t>Links to trello board / project management tools: </a:t>
             </a:r>
             <a:r>
               <a:rPr lang="en" sz="2000" b="1" dirty="0">
                 <a:solidFill>
                   <a:srgbClr val="274E13"/>
                 </a:solidFill>
+                <a:hlinkClick r:id="rId4"/>
               </a:rPr>
-              <a:t> board / project management tools:</a:t>
+              <a:t>Trello</a:t>
             </a:r>
             <a:endParaRPr sz="2000" dirty="0"/>
           </a:p>
@@ -6846,13 +6925,43 @@
               <a:buNone/>
             </a:pPr>
             <a:r>
-              <a:rPr lang="en" i="1"/>
+              <a:rPr lang="en" i="1" dirty="0"/>
               <a:t>Paste screenshots of your initial Trello board / task decomposition on this slide.  If you have a long list, you might need to break it up into several columns.  Delete this instruction when you are done.</a:t>
             </a:r>
-            <a:endParaRPr i="1"/>
+            <a:endParaRPr i="1" dirty="0"/>
           </a:p>
         </p:txBody>
       </p:sp>
+      <p:pic>
+        <p:nvPicPr>
+          <p:cNvPr id="3" name="Picture 2" descr="Graphical user interface, text, application&#10;&#10;Description automatically generated">
+            <a:extLst>
+              <a:ext uri="{FF2B5EF4-FFF2-40B4-BE49-F238E27FC236}">
+                <a16:creationId xmlns:a16="http://schemas.microsoft.com/office/drawing/2014/main" id="{0A711F85-FE64-43EF-B129-2C7D6375C8A1}"/>
+              </a:ext>
+            </a:extLst>
+          </p:cNvPr>
+          <p:cNvPicPr>
+            <a:picLocks noChangeAspect="1"/>
+          </p:cNvPicPr>
+          <p:nvPr/>
+        </p:nvPicPr>
+        <p:blipFill>
+          <a:blip r:embed="rId3"/>
+          <a:stretch>
+            <a:fillRect/>
+          </a:stretch>
+        </p:blipFill>
+        <p:spPr>
+          <a:xfrm>
+            <a:off x="0" y="1"/>
+            <a:ext cx="9144000" cy="5143500"/>
+          </a:xfrm>
+          <a:prstGeom prst="rect">
+            <a:avLst/>
+          </a:prstGeom>
+        </p:spPr>
+      </p:pic>
     </p:spTree>
   </p:cSld>
   <p:clrMapOvr>
@@ -6928,6 +7037,36 @@
           </a:p>
         </p:txBody>
       </p:sp>
+      <p:pic>
+        <p:nvPicPr>
+          <p:cNvPr id="3" name="Picture 2" descr="Graphical user interface, application&#10;&#10;Description automatically generated">
+            <a:extLst>
+              <a:ext uri="{FF2B5EF4-FFF2-40B4-BE49-F238E27FC236}">
+                <a16:creationId xmlns:a16="http://schemas.microsoft.com/office/drawing/2014/main" id="{1A910F03-6A26-4AF1-8A56-03A86AF638FA}"/>
+              </a:ext>
+            </a:extLst>
+          </p:cNvPr>
+          <p:cNvPicPr>
+            <a:picLocks noChangeAspect="1"/>
+          </p:cNvPicPr>
+          <p:nvPr/>
+        </p:nvPicPr>
+        <p:blipFill>
+          <a:blip r:embed="rId3"/>
+          <a:stretch>
+            <a:fillRect/>
+          </a:stretch>
+        </p:blipFill>
+        <p:spPr>
+          <a:xfrm>
+            <a:off x="0" y="1175113"/>
+            <a:ext cx="9144000" cy="1711234"/>
+          </a:xfrm>
+          <a:prstGeom prst="rect">
+            <a:avLst/>
+          </a:prstGeom>
+        </p:spPr>
+      </p:pic>
     </p:spTree>
   </p:cSld>
   <p:clrMapOvr>
@@ -6965,8 +7104,8 @@
         </p:nvSpPr>
         <p:spPr>
           <a:xfrm>
-            <a:off x="311700" y="445025"/>
-            <a:ext cx="8520600" cy="572700"/>
+            <a:off x="128819" y="246370"/>
+            <a:ext cx="8520600" cy="1132264"/>
           </a:xfrm>
           <a:prstGeom prst="rect">
             <a:avLst/>
@@ -6988,10 +7127,13 @@
               <a:buNone/>
             </a:pPr>
             <a:r>
-              <a:rPr lang="en"/>
+              <a:rPr lang="en" dirty="0"/>
               <a:t>Component 1 - Test Plan (?and screenshot)</a:t>
             </a:r>
-            <a:endParaRPr/>
+            <a:br>
+              <a:rPr lang="en" dirty="0"/>
+            </a:br>
+            <a:endParaRPr dirty="0"/>
           </a:p>
         </p:txBody>
       </p:sp>
@@ -6999,11 +7141,17 @@
         <p:nvGraphicFramePr>
           <p:cNvPr id="79" name="Google Shape;79;p17"/>
           <p:cNvGraphicFramePr/>
-          <p:nvPr/>
+          <p:nvPr>
+            <p:extLst>
+              <p:ext uri="{D42A27DB-BD31-4B8C-83A1-F6EECF244321}">
+                <p14:modId xmlns:p14="http://schemas.microsoft.com/office/powerpoint/2010/main" val="3011832350"/>
+              </p:ext>
+            </p:extLst>
+          </p:nvPr>
         </p:nvGraphicFramePr>
         <p:xfrm>
-          <a:off x="382475" y="1267725"/>
-          <a:ext cx="8520600" cy="914340"/>
+          <a:off x="311700" y="3764867"/>
+          <a:ext cx="8520600" cy="1188660"/>
         </p:xfrm>
         <a:graphic>
           <a:graphicData uri="http://schemas.openxmlformats.org/drawingml/2006/table">
@@ -7044,10 +7192,10 @@
                         <a:buNone/>
                       </a:pPr>
                       <a:r>
-                        <a:rPr lang="en" sz="1800" b="1"/>
+                        <a:rPr lang="en" sz="1800" b="1" dirty="0"/>
                         <a:t>Test Case</a:t>
                       </a:r>
-                      <a:endParaRPr sz="1800" b="1"/>
+                      <a:endParaRPr sz="1800" b="1" dirty="0"/>
                     </a:p>
                   </a:txBody>
                   <a:tcPr marL="91425" marR="91425" marT="91425" marB="91425">
@@ -7104,7 +7252,11 @@
                         </a:spcAft>
                         <a:buNone/>
                       </a:pPr>
-                      <a:endParaRPr sz="1800"/>
+                      <a:r>
+                        <a:rPr lang="en-GB" sz="1800" dirty="0"/>
+                        <a:t>Run Program</a:t>
+                      </a:r>
+                      <a:endParaRPr sz="1800" dirty="0"/>
                     </a:p>
                   </a:txBody>
                   <a:tcPr marL="91425" marR="91425" marT="91425" marB="91425"/>
@@ -7123,7 +7275,11 @@
                         </a:spcAft>
                         <a:buNone/>
                       </a:pPr>
-                      <a:endParaRPr sz="1800"/>
+                      <a:r>
+                        <a:rPr lang="en-GB" sz="1800" dirty="0"/>
+                        <a:t>Print Welcome Message With Random Name</a:t>
+                      </a:r>
+                      <a:endParaRPr sz="1800" dirty="0"/>
                     </a:p>
                   </a:txBody>
                   <a:tcPr marL="91425" marR="91425" marT="91425" marB="91425"/>
@@ -7138,6 +7294,66 @@
           </a:graphicData>
         </a:graphic>
       </p:graphicFrame>
+      <p:pic>
+        <p:nvPicPr>
+          <p:cNvPr id="3" name="Picture 2">
+            <a:extLst>
+              <a:ext uri="{FF2B5EF4-FFF2-40B4-BE49-F238E27FC236}">
+                <a16:creationId xmlns:a16="http://schemas.microsoft.com/office/drawing/2014/main" id="{E5C89010-92EE-4BD1-895D-3FDB2D757E2E}"/>
+              </a:ext>
+            </a:extLst>
+          </p:cNvPr>
+          <p:cNvPicPr>
+            <a:picLocks noChangeAspect="1"/>
+          </p:cNvPicPr>
+          <p:nvPr/>
+        </p:nvPicPr>
+        <p:blipFill>
+          <a:blip r:embed="rId3"/>
+          <a:stretch>
+            <a:fillRect/>
+          </a:stretch>
+        </p:blipFill>
+        <p:spPr>
+          <a:xfrm>
+            <a:off x="128818" y="1777627"/>
+            <a:ext cx="4443182" cy="1316501"/>
+          </a:xfrm>
+          <a:prstGeom prst="rect">
+            <a:avLst/>
+          </a:prstGeom>
+        </p:spPr>
+      </p:pic>
+      <p:pic>
+        <p:nvPicPr>
+          <p:cNvPr id="5" name="Picture 4">
+            <a:extLst>
+              <a:ext uri="{FF2B5EF4-FFF2-40B4-BE49-F238E27FC236}">
+                <a16:creationId xmlns:a16="http://schemas.microsoft.com/office/drawing/2014/main" id="{4D5852D8-4D00-41D8-AEF4-666CB79796DB}"/>
+              </a:ext>
+            </a:extLst>
+          </p:cNvPr>
+          <p:cNvPicPr>
+            <a:picLocks noChangeAspect="1"/>
+          </p:cNvPicPr>
+          <p:nvPr/>
+        </p:nvPicPr>
+        <p:blipFill>
+          <a:blip r:embed="rId4"/>
+          <a:stretch>
+            <a:fillRect/>
+          </a:stretch>
+        </p:blipFill>
+        <p:spPr>
+          <a:xfrm>
+            <a:off x="4572000" y="2218233"/>
+            <a:ext cx="4000500" cy="435288"/>
+          </a:xfrm>
+          <a:prstGeom prst="rect">
+            <a:avLst/>
+          </a:prstGeom>
+        </p:spPr>
+      </p:pic>
     </p:spTree>
   </p:cSld>
   <p:clrMapOvr>

</xml_diff>